<commit_message>
all updated, now finishing poster
</commit_message>
<xml_diff>
--- a/figures/figure5.pptx
+++ b/figures/figure5.pptx
@@ -118,7 +118,7 @@
 <file path=ppt/revisionInfo.xml><?xml version="1.0" encoding="utf-8"?>
 <p1510:revInfo xmlns:a="http://schemas.openxmlformats.org/drawingml/2006/main" xmlns:r="http://schemas.openxmlformats.org/officeDocument/2006/relationships" xmlns:p1510="http://schemas.microsoft.com/office/powerpoint/2015/10/main">
   <p1510:revLst>
-    <p1510:client id="{E3CA5065-40E2-4048-8D69-78AFFA4F5623}" v="21" dt="2024-06-06T20:44:37.205"/>
+    <p1510:client id="{E53B5EAC-3EAA-4AE7-A04B-A30A4941A48E}" v="1" dt="2024-07-12T16:28:33.685"/>
   </p1510:revLst>
 </p1510:revInfo>
 </file>
@@ -890,6 +890,46 @@
       </pc:sldChg>
     </pc:docChg>
   </pc:docChgLst>
+  <pc:docChgLst>
+    <pc:chgData name="Castiello de Obeso, Santiago" userId="b4fc0b8e-1f0e-417a-8aad-015961d2398a" providerId="ADAL" clId="{E53B5EAC-3EAA-4AE7-A04B-A30A4941A48E}"/>
+    <pc:docChg chg="custSel modSld">
+      <pc:chgData name="Castiello de Obeso, Santiago" userId="b4fc0b8e-1f0e-417a-8aad-015961d2398a" providerId="ADAL" clId="{E53B5EAC-3EAA-4AE7-A04B-A30A4941A48E}" dt="2024-07-12T16:28:34.368" v="31" actId="21"/>
+      <pc:docMkLst>
+        <pc:docMk/>
+      </pc:docMkLst>
+      <pc:sldChg chg="addSp delSp modSp mod">
+        <pc:chgData name="Castiello de Obeso, Santiago" userId="b4fc0b8e-1f0e-417a-8aad-015961d2398a" providerId="ADAL" clId="{E53B5EAC-3EAA-4AE7-A04B-A30A4941A48E}" dt="2024-07-12T16:28:34.368" v="31" actId="21"/>
+        <pc:sldMkLst>
+          <pc:docMk/>
+          <pc:sldMk cId="3838726312" sldId="266"/>
+        </pc:sldMkLst>
+        <pc:spChg chg="mod">
+          <ac:chgData name="Castiello de Obeso, Santiago" userId="b4fc0b8e-1f0e-417a-8aad-015961d2398a" providerId="ADAL" clId="{E53B5EAC-3EAA-4AE7-A04B-A30A4941A48E}" dt="2024-07-12T16:27:53.064" v="0" actId="27107"/>
+          <ac:spMkLst>
+            <pc:docMk/>
+            <pc:sldMk cId="3838726312" sldId="266"/>
+            <ac:spMk id="7" creationId="{F34F66C7-D6D5-98ED-9808-E3CE02B22D1C}"/>
+          </ac:spMkLst>
+        </pc:spChg>
+        <pc:grpChg chg="mod">
+          <ac:chgData name="Castiello de Obeso, Santiago" userId="b4fc0b8e-1f0e-417a-8aad-015961d2398a" providerId="ADAL" clId="{E53B5EAC-3EAA-4AE7-A04B-A30A4941A48E}" dt="2024-07-12T16:28:24.246" v="29" actId="1037"/>
+          <ac:grpSpMkLst>
+            <pc:docMk/>
+            <pc:sldMk cId="3838726312" sldId="266"/>
+            <ac:grpSpMk id="107" creationId="{5B59D50E-F041-CB1E-CEBC-21525F7925E2}"/>
+          </ac:grpSpMkLst>
+        </pc:grpChg>
+        <pc:picChg chg="add del mod">
+          <ac:chgData name="Castiello de Obeso, Santiago" userId="b4fc0b8e-1f0e-417a-8aad-015961d2398a" providerId="ADAL" clId="{E53B5EAC-3EAA-4AE7-A04B-A30A4941A48E}" dt="2024-07-12T16:28:34.368" v="31" actId="21"/>
+          <ac:picMkLst>
+            <pc:docMk/>
+            <pc:sldMk cId="3838726312" sldId="266"/>
+            <ac:picMk id="3" creationId="{FD9A830F-EC4E-93CC-E3C2-AF681485748D}"/>
+          </ac:picMkLst>
+        </pc:picChg>
+      </pc:sldChg>
+    </pc:docChg>
+  </pc:docChgLst>
 </pc:chgInfo>
 </file>
 
@@ -975,7 +1015,7 @@
           <a:p>
             <a:fld id="{16B75F31-AA6F-47C1-A408-2D23FB4F5524}" type="datetimeFigureOut">
               <a:rPr lang="en-GB" smtClean="0"/>
-              <a:t>06/06/2024</a:t>
+              <a:t>12/07/2024</a:t>
             </a:fld>
             <a:endParaRPr lang="en-GB"/>
           </a:p>
@@ -1374,7 +1414,7 @@
           <a:p>
             <a:fld id="{C9CE24B9-3E78-4475-9375-60BC55DBF332}" type="datetimeFigureOut">
               <a:rPr lang="en-GB" smtClean="0"/>
-              <a:t>06/06/2024</a:t>
+              <a:t>12/07/2024</a:t>
             </a:fld>
             <a:endParaRPr lang="en-GB"/>
           </a:p>
@@ -1544,7 +1584,7 @@
           <a:p>
             <a:fld id="{C9CE24B9-3E78-4475-9375-60BC55DBF332}" type="datetimeFigureOut">
               <a:rPr lang="en-GB" smtClean="0"/>
-              <a:t>06/06/2024</a:t>
+              <a:t>12/07/2024</a:t>
             </a:fld>
             <a:endParaRPr lang="en-GB"/>
           </a:p>
@@ -1724,7 +1764,7 @@
           <a:p>
             <a:fld id="{C9CE24B9-3E78-4475-9375-60BC55DBF332}" type="datetimeFigureOut">
               <a:rPr lang="en-GB" smtClean="0"/>
-              <a:t>06/06/2024</a:t>
+              <a:t>12/07/2024</a:t>
             </a:fld>
             <a:endParaRPr lang="en-GB"/>
           </a:p>
@@ -1894,7 +1934,7 @@
           <a:p>
             <a:fld id="{C9CE24B9-3E78-4475-9375-60BC55DBF332}" type="datetimeFigureOut">
               <a:rPr lang="en-GB" smtClean="0"/>
-              <a:t>06/06/2024</a:t>
+              <a:t>12/07/2024</a:t>
             </a:fld>
             <a:endParaRPr lang="en-GB"/>
           </a:p>
@@ -2138,7 +2178,7 @@
           <a:p>
             <a:fld id="{C9CE24B9-3E78-4475-9375-60BC55DBF332}" type="datetimeFigureOut">
               <a:rPr lang="en-GB" smtClean="0"/>
-              <a:t>06/06/2024</a:t>
+              <a:t>12/07/2024</a:t>
             </a:fld>
             <a:endParaRPr lang="en-GB"/>
           </a:p>
@@ -2370,7 +2410,7 @@
           <a:p>
             <a:fld id="{C9CE24B9-3E78-4475-9375-60BC55DBF332}" type="datetimeFigureOut">
               <a:rPr lang="en-GB" smtClean="0"/>
-              <a:t>06/06/2024</a:t>
+              <a:t>12/07/2024</a:t>
             </a:fld>
             <a:endParaRPr lang="en-GB"/>
           </a:p>
@@ -2737,7 +2777,7 @@
           <a:p>
             <a:fld id="{C9CE24B9-3E78-4475-9375-60BC55DBF332}" type="datetimeFigureOut">
               <a:rPr lang="en-GB" smtClean="0"/>
-              <a:t>06/06/2024</a:t>
+              <a:t>12/07/2024</a:t>
             </a:fld>
             <a:endParaRPr lang="en-GB"/>
           </a:p>
@@ -2855,7 +2895,7 @@
           <a:p>
             <a:fld id="{C9CE24B9-3E78-4475-9375-60BC55DBF332}" type="datetimeFigureOut">
               <a:rPr lang="en-GB" smtClean="0"/>
-              <a:t>06/06/2024</a:t>
+              <a:t>12/07/2024</a:t>
             </a:fld>
             <a:endParaRPr lang="en-GB"/>
           </a:p>
@@ -2950,7 +2990,7 @@
           <a:p>
             <a:fld id="{C9CE24B9-3E78-4475-9375-60BC55DBF332}" type="datetimeFigureOut">
               <a:rPr lang="en-GB" smtClean="0"/>
-              <a:t>06/06/2024</a:t>
+              <a:t>12/07/2024</a:t>
             </a:fld>
             <a:endParaRPr lang="en-GB"/>
           </a:p>
@@ -3227,7 +3267,7 @@
           <a:p>
             <a:fld id="{C9CE24B9-3E78-4475-9375-60BC55DBF332}" type="datetimeFigureOut">
               <a:rPr lang="en-GB" smtClean="0"/>
-              <a:t>06/06/2024</a:t>
+              <a:t>12/07/2024</a:t>
             </a:fld>
             <a:endParaRPr lang="en-GB"/>
           </a:p>
@@ -3484,7 +3524,7 @@
           <a:p>
             <a:fld id="{C9CE24B9-3E78-4475-9375-60BC55DBF332}" type="datetimeFigureOut">
               <a:rPr lang="en-GB" smtClean="0"/>
-              <a:t>06/06/2024</a:t>
+              <a:t>12/07/2024</a:t>
             </a:fld>
             <a:endParaRPr lang="en-GB"/>
           </a:p>
@@ -3697,7 +3737,7 @@
           <a:p>
             <a:fld id="{C9CE24B9-3E78-4475-9375-60BC55DBF332}" type="datetimeFigureOut">
               <a:rPr lang="en-GB" smtClean="0"/>
-              <a:t>06/06/2024</a:t>
+              <a:t>12/07/2024</a:t>
             </a:fld>
             <a:endParaRPr lang="en-GB"/>
           </a:p>
@@ -5300,7 +5340,7 @@
         </p:nvGrpSpPr>
         <p:grpSpPr>
           <a:xfrm>
-            <a:off x="5319381" y="3547531"/>
+            <a:off x="5177571" y="3547531"/>
             <a:ext cx="3600000" cy="3600000"/>
             <a:chOff x="5319381" y="3596431"/>
             <a:chExt cx="3600000" cy="3600000"/>

</xml_diff>

<commit_message>
figure.png created for Behind the Paper
</commit_message>
<xml_diff>
--- a/figures/figure5.pptx
+++ b/figures/figure5.pptx
@@ -115,14 +115,6 @@
 </p:presentation>
 </file>
 
-<file path=ppt/revisionInfo.xml><?xml version="1.0" encoding="utf-8"?>
-<p1510:revInfo xmlns:a="http://schemas.openxmlformats.org/drawingml/2006/main" xmlns:r="http://schemas.openxmlformats.org/officeDocument/2006/relationships" xmlns:p1510="http://schemas.microsoft.com/office/powerpoint/2015/10/main">
-  <p1510:revLst>
-    <p1510:client id="{E53B5EAC-3EAA-4AE7-A04B-A30A4941A48E}" v="1" dt="2024-07-12T16:28:33.685"/>
-  </p1510:revLst>
-</p1510:revInfo>
-</file>
-
 <file path=ppt/changesInfos/changesInfo1.xml><?xml version="1.0" encoding="utf-8"?>
 <pc:chgInfo xmlns:a="http://schemas.openxmlformats.org/drawingml/2006/main" xmlns:r="http://schemas.openxmlformats.org/officeDocument/2006/relationships" xmlns:ac="http://schemas.microsoft.com/office/drawing/2013/main/command" xmlns:pc="http://schemas.microsoft.com/office/powerpoint/2013/main/command">
   <pc:docChgLst>
@@ -930,6 +922,30 @@
       </pc:sldChg>
     </pc:docChg>
   </pc:docChgLst>
+  <pc:docChgLst>
+    <pc:chgData name="Castiello de Obeso, Santiago" userId="b4fc0b8e-1f0e-417a-8aad-015961d2398a" providerId="ADAL" clId="{6045B16F-5CCE-4DD5-B53F-6D115ED512A3}"/>
+    <pc:docChg chg="modSld">
+      <pc:chgData name="Castiello de Obeso, Santiago" userId="b4fc0b8e-1f0e-417a-8aad-015961d2398a" providerId="ADAL" clId="{6045B16F-5CCE-4DD5-B53F-6D115ED512A3}" dt="2024-11-29T14:45:45.269" v="0" actId="27107"/>
+      <pc:docMkLst>
+        <pc:docMk/>
+      </pc:docMkLst>
+      <pc:sldChg chg="modSp mod">
+        <pc:chgData name="Castiello de Obeso, Santiago" userId="b4fc0b8e-1f0e-417a-8aad-015961d2398a" providerId="ADAL" clId="{6045B16F-5CCE-4DD5-B53F-6D115ED512A3}" dt="2024-11-29T14:45:45.269" v="0" actId="27107"/>
+        <pc:sldMkLst>
+          <pc:docMk/>
+          <pc:sldMk cId="3838726312" sldId="266"/>
+        </pc:sldMkLst>
+        <pc:spChg chg="mod">
+          <ac:chgData name="Castiello de Obeso, Santiago" userId="b4fc0b8e-1f0e-417a-8aad-015961d2398a" providerId="ADAL" clId="{6045B16F-5CCE-4DD5-B53F-6D115ED512A3}" dt="2024-11-29T14:45:45.269" v="0" actId="27107"/>
+          <ac:spMkLst>
+            <pc:docMk/>
+            <pc:sldMk cId="3838726312" sldId="266"/>
+            <ac:spMk id="7" creationId="{F34F66C7-D6D5-98ED-9808-E3CE02B22D1C}"/>
+          </ac:spMkLst>
+        </pc:spChg>
+      </pc:sldChg>
+    </pc:docChg>
+  </pc:docChgLst>
 </pc:chgInfo>
 </file>
 
@@ -1015,7 +1031,7 @@
           <a:p>
             <a:fld id="{16B75F31-AA6F-47C1-A408-2D23FB4F5524}" type="datetimeFigureOut">
               <a:rPr lang="en-GB" smtClean="0"/>
-              <a:t>12/07/2024</a:t>
+              <a:t>29/11/2024</a:t>
             </a:fld>
             <a:endParaRPr lang="en-GB"/>
           </a:p>
@@ -1414,7 +1430,7 @@
           <a:p>
             <a:fld id="{C9CE24B9-3E78-4475-9375-60BC55DBF332}" type="datetimeFigureOut">
               <a:rPr lang="en-GB" smtClean="0"/>
-              <a:t>12/07/2024</a:t>
+              <a:t>29/11/2024</a:t>
             </a:fld>
             <a:endParaRPr lang="en-GB"/>
           </a:p>
@@ -1584,7 +1600,7 @@
           <a:p>
             <a:fld id="{C9CE24B9-3E78-4475-9375-60BC55DBF332}" type="datetimeFigureOut">
               <a:rPr lang="en-GB" smtClean="0"/>
-              <a:t>12/07/2024</a:t>
+              <a:t>29/11/2024</a:t>
             </a:fld>
             <a:endParaRPr lang="en-GB"/>
           </a:p>
@@ -1764,7 +1780,7 @@
           <a:p>
             <a:fld id="{C9CE24B9-3E78-4475-9375-60BC55DBF332}" type="datetimeFigureOut">
               <a:rPr lang="en-GB" smtClean="0"/>
-              <a:t>12/07/2024</a:t>
+              <a:t>29/11/2024</a:t>
             </a:fld>
             <a:endParaRPr lang="en-GB"/>
           </a:p>
@@ -1934,7 +1950,7 @@
           <a:p>
             <a:fld id="{C9CE24B9-3E78-4475-9375-60BC55DBF332}" type="datetimeFigureOut">
               <a:rPr lang="en-GB" smtClean="0"/>
-              <a:t>12/07/2024</a:t>
+              <a:t>29/11/2024</a:t>
             </a:fld>
             <a:endParaRPr lang="en-GB"/>
           </a:p>
@@ -2178,7 +2194,7 @@
           <a:p>
             <a:fld id="{C9CE24B9-3E78-4475-9375-60BC55DBF332}" type="datetimeFigureOut">
               <a:rPr lang="en-GB" smtClean="0"/>
-              <a:t>12/07/2024</a:t>
+              <a:t>29/11/2024</a:t>
             </a:fld>
             <a:endParaRPr lang="en-GB"/>
           </a:p>
@@ -2410,7 +2426,7 @@
           <a:p>
             <a:fld id="{C9CE24B9-3E78-4475-9375-60BC55DBF332}" type="datetimeFigureOut">
               <a:rPr lang="en-GB" smtClean="0"/>
-              <a:t>12/07/2024</a:t>
+              <a:t>29/11/2024</a:t>
             </a:fld>
             <a:endParaRPr lang="en-GB"/>
           </a:p>
@@ -2777,7 +2793,7 @@
           <a:p>
             <a:fld id="{C9CE24B9-3E78-4475-9375-60BC55DBF332}" type="datetimeFigureOut">
               <a:rPr lang="en-GB" smtClean="0"/>
-              <a:t>12/07/2024</a:t>
+              <a:t>29/11/2024</a:t>
             </a:fld>
             <a:endParaRPr lang="en-GB"/>
           </a:p>
@@ -2895,7 +2911,7 @@
           <a:p>
             <a:fld id="{C9CE24B9-3E78-4475-9375-60BC55DBF332}" type="datetimeFigureOut">
               <a:rPr lang="en-GB" smtClean="0"/>
-              <a:t>12/07/2024</a:t>
+              <a:t>29/11/2024</a:t>
             </a:fld>
             <a:endParaRPr lang="en-GB"/>
           </a:p>
@@ -2990,7 +3006,7 @@
           <a:p>
             <a:fld id="{C9CE24B9-3E78-4475-9375-60BC55DBF332}" type="datetimeFigureOut">
               <a:rPr lang="en-GB" smtClean="0"/>
-              <a:t>12/07/2024</a:t>
+              <a:t>29/11/2024</a:t>
             </a:fld>
             <a:endParaRPr lang="en-GB"/>
           </a:p>
@@ -3267,7 +3283,7 @@
           <a:p>
             <a:fld id="{C9CE24B9-3E78-4475-9375-60BC55DBF332}" type="datetimeFigureOut">
               <a:rPr lang="en-GB" smtClean="0"/>
-              <a:t>12/07/2024</a:t>
+              <a:t>29/11/2024</a:t>
             </a:fld>
             <a:endParaRPr lang="en-GB"/>
           </a:p>
@@ -3524,7 +3540,7 @@
           <a:p>
             <a:fld id="{C9CE24B9-3E78-4475-9375-60BC55DBF332}" type="datetimeFigureOut">
               <a:rPr lang="en-GB" smtClean="0"/>
-              <a:t>12/07/2024</a:t>
+              <a:t>29/11/2024</a:t>
             </a:fld>
             <a:endParaRPr lang="en-GB"/>
           </a:p>
@@ -3737,7 +3753,7 @@
           <a:p>
             <a:fld id="{C9CE24B9-3E78-4475-9375-60BC55DBF332}" type="datetimeFigureOut">
               <a:rPr lang="en-GB" smtClean="0"/>
-              <a:t>12/07/2024</a:t>
+              <a:t>29/11/2024</a:t>
             </a:fld>
             <a:endParaRPr lang="en-GB"/>
           </a:p>

</xml_diff>